<commit_message>
Update for changes made during lecture
- Add some more example code with variant values
- Remove iclicker question 3
- Change name of file for consistency
</commit_message>
<xml_diff>
--- a/05-variant/lec.pptx
+++ b/05-variant/lec.pptx
@@ -5,7 +5,7 @@
     <p:sldMasterId id="2147483648" r:id="rId1"/>
   </p:sldMasterIdLst>
   <p:notesMasterIdLst>
-    <p:notesMasterId r:id="rId26"/>
+    <p:notesMasterId r:id="rId21"/>
   </p:notesMasterIdLst>
   <p:sldIdLst>
     <p:sldId id="441" r:id="rId2"/>
@@ -20,18 +20,13 @@
     <p:sldId id="453" r:id="rId11"/>
     <p:sldId id="464" r:id="rId12"/>
     <p:sldId id="470" r:id="rId13"/>
-    <p:sldId id="531" r:id="rId14"/>
-    <p:sldId id="524" r:id="rId15"/>
-    <p:sldId id="471" r:id="rId16"/>
-    <p:sldId id="526" r:id="rId17"/>
-    <p:sldId id="525" r:id="rId18"/>
-    <p:sldId id="532" r:id="rId19"/>
-    <p:sldId id="491" r:id="rId20"/>
-    <p:sldId id="484" r:id="rId21"/>
-    <p:sldId id="530" r:id="rId22"/>
-    <p:sldId id="501" r:id="rId23"/>
-    <p:sldId id="502" r:id="rId24"/>
-    <p:sldId id="503" r:id="rId25"/>
+    <p:sldId id="524" r:id="rId14"/>
+    <p:sldId id="471" r:id="rId15"/>
+    <p:sldId id="526" r:id="rId16"/>
+    <p:sldId id="525" r:id="rId17"/>
+    <p:sldId id="532" r:id="rId18"/>
+    <p:sldId id="491" r:id="rId19"/>
+    <p:sldId id="484" r:id="rId20"/>
   </p:sldIdLst>
   <p:sldSz cx="10058400" cy="7772400"/>
   <p:notesSz cx="6858000" cy="9144000"/>
@@ -231,7 +226,7 @@
           <a:p>
             <a:fld id="{5367F125-181F-9A48-A24E-AAD89CB055B5}" type="datetimeFigureOut">
               <a:rPr lang="en-US" smtClean="0"/>
-              <a:t>9/10/19</a:t>
+              <a:t>9/12/19</a:t>
             </a:fld>
             <a:endParaRPr lang="en-US"/>
           </a:p>
@@ -665,7 +660,7 @@
           <a:p>
             <a:fld id="{B7975FD5-AB21-4C45-BFE8-1D3F02B463E2}" type="slidenum">
               <a:rPr lang="en-US" smtClean="0"/>
-              <a:t>17</a:t>
+              <a:t>16</a:t>
             </a:fld>
             <a:endParaRPr lang="en-US"/>
           </a:p>
@@ -754,7 +749,7 @@
           <a:p>
             <a:fld id="{B7975FD5-AB21-4C45-BFE8-1D3F02B463E2}" type="slidenum">
               <a:rPr lang="en-US" smtClean="0"/>
-              <a:t>20</a:t>
+              <a:t>19</a:t>
             </a:fld>
             <a:endParaRPr lang="en-US"/>
           </a:p>
@@ -764,183 +759,6 @@
     <p:extLst>
       <p:ext uri="{BB962C8B-B14F-4D97-AF65-F5344CB8AC3E}">
         <p14:creationId xmlns:p14="http://schemas.microsoft.com/office/powerpoint/2010/main" val="2847625345"/>
-      </p:ext>
-    </p:extLst>
-  </p:cSld>
-  <p:clrMapOvr>
-    <a:masterClrMapping/>
-  </p:clrMapOvr>
-</p:notes>
-</file>
-
-<file path=ppt/notesSlides/notesSlide12.xml><?xml version="1.0" encoding="utf-8"?>
-<p:notes xmlns:a="http://schemas.openxmlformats.org/drawingml/2006/main" xmlns:r="http://schemas.openxmlformats.org/officeDocument/2006/relationships" xmlns:p="http://schemas.openxmlformats.org/presentationml/2006/main">
-  <p:cSld>
-    <p:spTree>
-      <p:nvGrpSpPr>
-        <p:cNvPr id="1" name=""/>
-        <p:cNvGrpSpPr/>
-        <p:nvPr/>
-      </p:nvGrpSpPr>
-      <p:grpSpPr>
-        <a:xfrm>
-          <a:off x="0" y="0"/>
-          <a:ext cx="0" cy="0"/>
-          <a:chOff x="0" y="0"/>
-          <a:chExt cx="0" cy="0"/>
-        </a:xfrm>
-      </p:grpSpPr>
-      <p:sp>
-        <p:nvSpPr>
-          <p:cNvPr id="2" name="Slide Image Placeholder 1"/>
-          <p:cNvSpPr>
-            <a:spLocks noGrp="1" noRot="1" noChangeAspect="1"/>
-          </p:cNvSpPr>
-          <p:nvPr>
-            <p:ph type="sldImg"/>
-          </p:nvPr>
-        </p:nvSpPr>
-        <p:spPr/>
-      </p:sp>
-      <p:sp>
-        <p:nvSpPr>
-          <p:cNvPr id="3" name="Notes Placeholder 2"/>
-          <p:cNvSpPr>
-            <a:spLocks noGrp="1"/>
-          </p:cNvSpPr>
-          <p:nvPr>
-            <p:ph type="body" idx="1"/>
-          </p:nvPr>
-        </p:nvSpPr>
-        <p:spPr/>
-        <p:txBody>
-          <a:bodyPr/>
-          <a:lstStyle/>
-          <a:p>
-            <a:endParaRPr lang="en-US" dirty="0"/>
-          </a:p>
-        </p:txBody>
-      </p:sp>
-      <p:sp>
-        <p:nvSpPr>
-          <p:cNvPr id="4" name="Slide Number Placeholder 3"/>
-          <p:cNvSpPr>
-            <a:spLocks noGrp="1"/>
-          </p:cNvSpPr>
-          <p:nvPr>
-            <p:ph type="sldNum" sz="quarter" idx="5"/>
-          </p:nvPr>
-        </p:nvSpPr>
-        <p:spPr/>
-        <p:txBody>
-          <a:bodyPr/>
-          <a:lstStyle/>
-          <a:p>
-            <a:fld id="{B7975FD5-AB21-4C45-BFE8-1D3F02B463E2}" type="slidenum">
-              <a:rPr lang="en-US" smtClean="0"/>
-              <a:t>22</a:t>
-            </a:fld>
-            <a:endParaRPr lang="en-US"/>
-          </a:p>
-        </p:txBody>
-      </p:sp>
-    </p:spTree>
-    <p:extLst>
-      <p:ext uri="{BB962C8B-B14F-4D97-AF65-F5344CB8AC3E}">
-        <p14:creationId xmlns:p14="http://schemas.microsoft.com/office/powerpoint/2010/main" val="3761730889"/>
-      </p:ext>
-    </p:extLst>
-  </p:cSld>
-  <p:clrMapOvr>
-    <a:masterClrMapping/>
-  </p:clrMapOvr>
-</p:notes>
-</file>
-
-<file path=ppt/notesSlides/notesSlide13.xml><?xml version="1.0" encoding="utf-8"?>
-<p:notes xmlns:a="http://schemas.openxmlformats.org/drawingml/2006/main" xmlns:r="http://schemas.openxmlformats.org/officeDocument/2006/relationships" xmlns:p="http://schemas.openxmlformats.org/presentationml/2006/main">
-  <p:cSld>
-    <p:spTree>
-      <p:nvGrpSpPr>
-        <p:cNvPr id="1" name=""/>
-        <p:cNvGrpSpPr/>
-        <p:nvPr/>
-      </p:nvGrpSpPr>
-      <p:grpSpPr>
-        <a:xfrm>
-          <a:off x="0" y="0"/>
-          <a:ext cx="0" cy="0"/>
-          <a:chOff x="0" y="0"/>
-          <a:chExt cx="0" cy="0"/>
-        </a:xfrm>
-      </p:grpSpPr>
-      <p:sp>
-        <p:nvSpPr>
-          <p:cNvPr id="2" name="Slide Image Placeholder 1"/>
-          <p:cNvSpPr>
-            <a:spLocks noGrp="1" noRot="1" noChangeAspect="1"/>
-          </p:cNvSpPr>
-          <p:nvPr>
-            <p:ph type="sldImg"/>
-          </p:nvPr>
-        </p:nvSpPr>
-        <p:spPr/>
-      </p:sp>
-      <p:sp>
-        <p:nvSpPr>
-          <p:cNvPr id="3" name="Notes Placeholder 2"/>
-          <p:cNvSpPr>
-            <a:spLocks noGrp="1"/>
-          </p:cNvSpPr>
-          <p:nvPr>
-            <p:ph type="body" idx="1"/>
-          </p:nvPr>
-        </p:nvSpPr>
-        <p:spPr/>
-        <p:txBody>
-          <a:bodyPr/>
-          <a:lstStyle/>
-          <a:p>
-            <a:r>
-              <a:rPr lang="en-US" dirty="0"/>
-              <a:t>Look back at shapes:  both + and x</a:t>
-            </a:r>
-          </a:p>
-          <a:p>
-            <a:r>
-              <a:rPr lang="en-US" dirty="0"/>
-              <a:t>But you could also have a record with a field whose type is variant</a:t>
-            </a:r>
-          </a:p>
-        </p:txBody>
-      </p:sp>
-      <p:sp>
-        <p:nvSpPr>
-          <p:cNvPr id="4" name="Slide Number Placeholder 3"/>
-          <p:cNvSpPr>
-            <a:spLocks noGrp="1"/>
-          </p:cNvSpPr>
-          <p:nvPr>
-            <p:ph type="sldNum" sz="quarter" idx="5"/>
-          </p:nvPr>
-        </p:nvSpPr>
-        <p:spPr/>
-        <p:txBody>
-          <a:bodyPr/>
-          <a:lstStyle/>
-          <a:p>
-            <a:fld id="{B7975FD5-AB21-4C45-BFE8-1D3F02B463E2}" type="slidenum">
-              <a:rPr lang="en-US" smtClean="0"/>
-              <a:t>24</a:t>
-            </a:fld>
-            <a:endParaRPr lang="en-US"/>
-          </a:p>
-        </p:txBody>
-      </p:sp>
-    </p:spTree>
-    <p:extLst>
-      <p:ext uri="{BB962C8B-B14F-4D97-AF65-F5344CB8AC3E}">
-        <p14:creationId xmlns:p14="http://schemas.microsoft.com/office/powerpoint/2010/main" val="2170683218"/>
       </p:ext>
     </p:extLst>
   </p:cSld>
@@ -1234,429 +1052,6 @@
             </a:endParaRPr>
           </a:p>
           <a:p>
-            <a:br>
-              <a:rPr lang="en-US" sz="1300" b="0" kern="1200" dirty="0">
-                <a:solidFill>
-                  <a:schemeClr val="tx1"/>
-                </a:solidFill>
-                <a:effectLst/>
-                <a:latin typeface="+mn-lt"/>
-                <a:ea typeface="+mn-ea"/>
-                <a:cs typeface="+mn-cs"/>
-              </a:rPr>
-            </a:br>
-            <a:r>
-              <a:rPr lang="en-US" sz="1300" b="0" kern="1200" dirty="0">
-                <a:solidFill>
-                  <a:schemeClr val="tx1"/>
-                </a:solidFill>
-                <a:effectLst/>
-                <a:latin typeface="+mn-lt"/>
-                <a:ea typeface="+mn-ea"/>
-                <a:cs typeface="+mn-cs"/>
-              </a:rPr>
-              <a:t>(*</a:t>
-            </a:r>
-            <a:r>
-              <a:rPr lang="en-US" sz="1300" b="0" i="1" kern="1200" dirty="0">
-                <a:solidFill>
-                  <a:schemeClr val="tx1"/>
-                </a:solidFill>
-                <a:effectLst/>
-                <a:latin typeface="+mn-lt"/>
-                <a:ea typeface="+mn-ea"/>
-                <a:cs typeface="+mn-cs"/>
-              </a:rPr>
-              <a:t> more complicated variant with non-constant constructors </a:t>
-            </a:r>
-            <a:r>
-              <a:rPr lang="en-US" sz="1300" b="0" kern="1200" dirty="0">
-                <a:solidFill>
-                  <a:schemeClr val="tx1"/>
-                </a:solidFill>
-                <a:effectLst/>
-                <a:latin typeface="+mn-lt"/>
-                <a:ea typeface="+mn-ea"/>
-                <a:cs typeface="+mn-cs"/>
-              </a:rPr>
-              <a:t>*)</a:t>
-            </a:r>
-          </a:p>
-          <a:p>
-            <a:br>
-              <a:rPr lang="en-US" sz="1300" b="0" kern="1200" dirty="0">
-                <a:solidFill>
-                  <a:schemeClr val="tx1"/>
-                </a:solidFill>
-                <a:effectLst/>
-                <a:latin typeface="+mn-lt"/>
-                <a:ea typeface="+mn-ea"/>
-                <a:cs typeface="+mn-cs"/>
-              </a:rPr>
-            </a:br>
-            <a:r>
-              <a:rPr lang="en-US" sz="1300" b="0" u="sng" kern="1200" dirty="0">
-                <a:solidFill>
-                  <a:schemeClr val="tx1"/>
-                </a:solidFill>
-                <a:effectLst/>
-                <a:latin typeface="+mn-lt"/>
-                <a:ea typeface="+mn-ea"/>
-                <a:cs typeface="+mn-cs"/>
-              </a:rPr>
-              <a:t>type</a:t>
-            </a:r>
-            <a:r>
-              <a:rPr lang="en-US" sz="1300" b="0" kern="1200" dirty="0">
-                <a:solidFill>
-                  <a:schemeClr val="tx1"/>
-                </a:solidFill>
-                <a:effectLst/>
-                <a:latin typeface="+mn-lt"/>
-                <a:ea typeface="+mn-ea"/>
-                <a:cs typeface="+mn-cs"/>
-              </a:rPr>
-              <a:t> </a:t>
-            </a:r>
-            <a:r>
-              <a:rPr lang="en-US" sz="1300" b="1" kern="1200" dirty="0">
-                <a:solidFill>
-                  <a:schemeClr val="tx1"/>
-                </a:solidFill>
-                <a:effectLst/>
-                <a:latin typeface="+mn-lt"/>
-                <a:ea typeface="+mn-ea"/>
-                <a:cs typeface="+mn-cs"/>
-              </a:rPr>
-              <a:t>point</a:t>
-            </a:r>
-            <a:r>
-              <a:rPr lang="en-US" sz="1300" b="0" kern="1200" dirty="0">
-                <a:solidFill>
-                  <a:schemeClr val="tx1"/>
-                </a:solidFill>
-                <a:effectLst/>
-                <a:latin typeface="+mn-lt"/>
-                <a:ea typeface="+mn-ea"/>
-                <a:cs typeface="+mn-cs"/>
-              </a:rPr>
-              <a:t> </a:t>
-            </a:r>
-            <a:r>
-              <a:rPr lang="en-US" sz="1300" b="1" kern="1200" dirty="0">
-                <a:solidFill>
-                  <a:schemeClr val="tx1"/>
-                </a:solidFill>
-                <a:effectLst/>
-                <a:latin typeface="+mn-lt"/>
-                <a:ea typeface="+mn-ea"/>
-                <a:cs typeface="+mn-cs"/>
-              </a:rPr>
-              <a:t>=</a:t>
-            </a:r>
-            <a:r>
-              <a:rPr lang="en-US" sz="1300" b="0" kern="1200" dirty="0">
-                <a:solidFill>
-                  <a:schemeClr val="tx1"/>
-                </a:solidFill>
-                <a:effectLst/>
-                <a:latin typeface="+mn-lt"/>
-                <a:ea typeface="+mn-ea"/>
-                <a:cs typeface="+mn-cs"/>
-              </a:rPr>
-              <a:t> float </a:t>
-            </a:r>
-            <a:r>
-              <a:rPr lang="en-US" sz="1300" b="1" kern="1200" dirty="0">
-                <a:solidFill>
-                  <a:schemeClr val="tx1"/>
-                </a:solidFill>
-                <a:effectLst/>
-                <a:latin typeface="+mn-lt"/>
-                <a:ea typeface="+mn-ea"/>
-                <a:cs typeface="+mn-cs"/>
-              </a:rPr>
-              <a:t>*</a:t>
-            </a:r>
-            <a:r>
-              <a:rPr lang="en-US" sz="1300" b="0" kern="1200" dirty="0">
-                <a:solidFill>
-                  <a:schemeClr val="tx1"/>
-                </a:solidFill>
-                <a:effectLst/>
-                <a:latin typeface="+mn-lt"/>
-                <a:ea typeface="+mn-ea"/>
-                <a:cs typeface="+mn-cs"/>
-              </a:rPr>
-              <a:t> float</a:t>
-            </a:r>
-          </a:p>
-          <a:p>
-            <a:br>
-              <a:rPr lang="en-US" sz="1300" b="0" kern="1200" dirty="0">
-                <a:solidFill>
-                  <a:schemeClr val="tx1"/>
-                </a:solidFill>
-                <a:effectLst/>
-                <a:latin typeface="+mn-lt"/>
-                <a:ea typeface="+mn-ea"/>
-                <a:cs typeface="+mn-cs"/>
-              </a:rPr>
-            </a:br>
-            <a:r>
-              <a:rPr lang="en-US" sz="1300" b="0" u="sng" kern="1200" dirty="0">
-                <a:solidFill>
-                  <a:schemeClr val="tx1"/>
-                </a:solidFill>
-                <a:effectLst/>
-                <a:latin typeface="+mn-lt"/>
-                <a:ea typeface="+mn-ea"/>
-                <a:cs typeface="+mn-cs"/>
-              </a:rPr>
-              <a:t>type</a:t>
-            </a:r>
-            <a:r>
-              <a:rPr lang="en-US" sz="1300" b="0" kern="1200" dirty="0">
-                <a:solidFill>
-                  <a:schemeClr val="tx1"/>
-                </a:solidFill>
-                <a:effectLst/>
-                <a:latin typeface="+mn-lt"/>
-                <a:ea typeface="+mn-ea"/>
-                <a:cs typeface="+mn-cs"/>
-              </a:rPr>
-              <a:t> </a:t>
-            </a:r>
-            <a:r>
-              <a:rPr lang="en-US" sz="1300" b="1" kern="1200" dirty="0">
-                <a:solidFill>
-                  <a:schemeClr val="tx1"/>
-                </a:solidFill>
-                <a:effectLst/>
-                <a:latin typeface="+mn-lt"/>
-                <a:ea typeface="+mn-ea"/>
-                <a:cs typeface="+mn-cs"/>
-              </a:rPr>
-              <a:t>shape</a:t>
-            </a:r>
-            <a:r>
-              <a:rPr lang="en-US" sz="1300" b="0" kern="1200" dirty="0">
-                <a:solidFill>
-                  <a:schemeClr val="tx1"/>
-                </a:solidFill>
-                <a:effectLst/>
-                <a:latin typeface="+mn-lt"/>
-                <a:ea typeface="+mn-ea"/>
-                <a:cs typeface="+mn-cs"/>
-              </a:rPr>
-              <a:t> </a:t>
-            </a:r>
-            <a:r>
-              <a:rPr lang="en-US" sz="1300" b="1" kern="1200" dirty="0">
-                <a:solidFill>
-                  <a:schemeClr val="tx1"/>
-                </a:solidFill>
-                <a:effectLst/>
-                <a:latin typeface="+mn-lt"/>
-                <a:ea typeface="+mn-ea"/>
-                <a:cs typeface="+mn-cs"/>
-              </a:rPr>
-              <a:t>=</a:t>
-            </a:r>
-            <a:r>
-              <a:rPr lang="en-US" sz="1300" b="0" kern="1200" dirty="0">
-                <a:solidFill>
-                  <a:schemeClr val="tx1"/>
-                </a:solidFill>
-                <a:effectLst/>
-                <a:latin typeface="+mn-lt"/>
-                <a:ea typeface="+mn-ea"/>
-                <a:cs typeface="+mn-cs"/>
-              </a:rPr>
-              <a:t> </a:t>
-            </a:r>
-          </a:p>
-          <a:p>
-            <a:r>
-              <a:rPr lang="en-US" sz="1300" b="0" kern="1200" dirty="0">
-                <a:solidFill>
-                  <a:schemeClr val="tx1"/>
-                </a:solidFill>
-                <a:effectLst/>
-                <a:latin typeface="+mn-lt"/>
-                <a:ea typeface="+mn-ea"/>
-                <a:cs typeface="+mn-cs"/>
-              </a:rPr>
-              <a:t>  </a:t>
-            </a:r>
-            <a:r>
-              <a:rPr lang="en-US" sz="1300" b="1" kern="1200" dirty="0">
-                <a:solidFill>
-                  <a:schemeClr val="tx1"/>
-                </a:solidFill>
-                <a:effectLst/>
-                <a:latin typeface="+mn-lt"/>
-                <a:ea typeface="+mn-ea"/>
-                <a:cs typeface="+mn-cs"/>
-              </a:rPr>
-              <a:t>|</a:t>
-            </a:r>
-            <a:r>
-              <a:rPr lang="en-US" sz="1300" b="0" kern="1200" dirty="0">
-                <a:solidFill>
-                  <a:schemeClr val="tx1"/>
-                </a:solidFill>
-                <a:effectLst/>
-                <a:latin typeface="+mn-lt"/>
-                <a:ea typeface="+mn-ea"/>
-                <a:cs typeface="+mn-cs"/>
-              </a:rPr>
-              <a:t> </a:t>
-            </a:r>
-            <a:r>
-              <a:rPr lang="en-US" sz="1300" b="1" kern="1200" dirty="0">
-                <a:solidFill>
-                  <a:schemeClr val="tx1"/>
-                </a:solidFill>
-                <a:effectLst/>
-                <a:latin typeface="+mn-lt"/>
-                <a:ea typeface="+mn-ea"/>
-                <a:cs typeface="+mn-cs"/>
-              </a:rPr>
-              <a:t>Circle</a:t>
-            </a:r>
-            <a:r>
-              <a:rPr lang="en-US" sz="1300" b="0" kern="1200" dirty="0">
-                <a:solidFill>
-                  <a:schemeClr val="tx1"/>
-                </a:solidFill>
-                <a:effectLst/>
-                <a:latin typeface="+mn-lt"/>
-                <a:ea typeface="+mn-ea"/>
-                <a:cs typeface="+mn-cs"/>
-              </a:rPr>
-              <a:t> of </a:t>
-            </a:r>
-            <a:r>
-              <a:rPr lang="en-US" sz="1300" b="1" kern="1200" dirty="0">
-                <a:solidFill>
-                  <a:schemeClr val="tx1"/>
-                </a:solidFill>
-                <a:effectLst/>
-                <a:latin typeface="+mn-lt"/>
-                <a:ea typeface="+mn-ea"/>
-                <a:cs typeface="+mn-cs"/>
-              </a:rPr>
-              <a:t>{</a:t>
-            </a:r>
-            <a:r>
-              <a:rPr lang="en-US" sz="1300" b="0" i="1" kern="1200" dirty="0">
-                <a:solidFill>
-                  <a:schemeClr val="tx1"/>
-                </a:solidFill>
-                <a:effectLst/>
-                <a:latin typeface="+mn-lt"/>
-                <a:ea typeface="+mn-ea"/>
-                <a:cs typeface="+mn-cs"/>
-              </a:rPr>
-              <a:t>center</a:t>
-            </a:r>
-            <a:r>
-              <a:rPr lang="en-US" sz="1300" b="0" kern="1200" dirty="0">
-                <a:solidFill>
-                  <a:schemeClr val="tx1"/>
-                </a:solidFill>
-                <a:effectLst/>
-                <a:latin typeface="+mn-lt"/>
-                <a:ea typeface="+mn-ea"/>
-                <a:cs typeface="+mn-cs"/>
-              </a:rPr>
-              <a:t> </a:t>
-            </a:r>
-            <a:r>
-              <a:rPr lang="en-US" sz="1300" b="1" kern="1200" dirty="0">
-                <a:solidFill>
-                  <a:schemeClr val="tx1"/>
-                </a:solidFill>
-                <a:effectLst/>
-                <a:latin typeface="+mn-lt"/>
-                <a:ea typeface="+mn-ea"/>
-                <a:cs typeface="+mn-cs"/>
-              </a:rPr>
-              <a:t>:</a:t>
-            </a:r>
-            <a:r>
-              <a:rPr lang="en-US" sz="1300" b="0" kern="1200" dirty="0">
-                <a:solidFill>
-                  <a:schemeClr val="tx1"/>
-                </a:solidFill>
-                <a:effectLst/>
-                <a:latin typeface="+mn-lt"/>
-                <a:ea typeface="+mn-ea"/>
-                <a:cs typeface="+mn-cs"/>
-              </a:rPr>
-              <a:t> point; </a:t>
-            </a:r>
-            <a:r>
-              <a:rPr lang="en-US" sz="1300" b="0" i="1" kern="1200" dirty="0">
-                <a:solidFill>
-                  <a:schemeClr val="tx1"/>
-                </a:solidFill>
-                <a:effectLst/>
-                <a:latin typeface="+mn-lt"/>
-                <a:ea typeface="+mn-ea"/>
-                <a:cs typeface="+mn-cs"/>
-              </a:rPr>
-              <a:t>radius</a:t>
-            </a:r>
-            <a:r>
-              <a:rPr lang="en-US" sz="1300" b="0" kern="1200" dirty="0">
-                <a:solidFill>
-                  <a:schemeClr val="tx1"/>
-                </a:solidFill>
-                <a:effectLst/>
-                <a:latin typeface="+mn-lt"/>
-                <a:ea typeface="+mn-ea"/>
-                <a:cs typeface="+mn-cs"/>
-              </a:rPr>
-              <a:t> </a:t>
-            </a:r>
-            <a:r>
-              <a:rPr lang="en-US" sz="1300" b="1" kern="1200" dirty="0">
-                <a:solidFill>
-                  <a:schemeClr val="tx1"/>
-                </a:solidFill>
-                <a:effectLst/>
-                <a:latin typeface="+mn-lt"/>
-                <a:ea typeface="+mn-ea"/>
-                <a:cs typeface="+mn-cs"/>
-              </a:rPr>
-              <a:t>:</a:t>
-            </a:r>
-            <a:r>
-              <a:rPr lang="en-US" sz="1300" b="0" kern="1200" dirty="0">
-                <a:solidFill>
-                  <a:schemeClr val="tx1"/>
-                </a:solidFill>
-                <a:effectLst/>
-                <a:latin typeface="+mn-lt"/>
-                <a:ea typeface="+mn-ea"/>
-                <a:cs typeface="+mn-cs"/>
-              </a:rPr>
-              <a:t> float</a:t>
-            </a:r>
-            <a:r>
-              <a:rPr lang="en-US" sz="1300" b="1" kern="1200" dirty="0">
-                <a:solidFill>
-                  <a:schemeClr val="tx1"/>
-                </a:solidFill>
-                <a:effectLst/>
-                <a:latin typeface="+mn-lt"/>
-                <a:ea typeface="+mn-ea"/>
-                <a:cs typeface="+mn-cs"/>
-              </a:rPr>
-              <a:t>}</a:t>
-            </a:r>
             <a:endParaRPr lang="en-US" sz="1300" b="0" kern="1200" dirty="0">
               <a:solidFill>
                 <a:schemeClr val="tx1"/>
@@ -1678,6 +1073,263 @@
                 <a:ea typeface="+mn-ea"/>
                 <a:cs typeface="+mn-cs"/>
               </a:rPr>
+              <a:t>let c = Red</a:t>
+            </a:r>
+          </a:p>
+          <a:p>
+            <a:br>
+              <a:rPr lang="en-US" sz="1300" b="0" kern="1200" dirty="0">
+                <a:solidFill>
+                  <a:schemeClr val="tx1"/>
+                </a:solidFill>
+                <a:effectLst/>
+                <a:latin typeface="+mn-lt"/>
+                <a:ea typeface="+mn-ea"/>
+                <a:cs typeface="+mn-cs"/>
+              </a:rPr>
+            </a:br>
+            <a:r>
+              <a:rPr lang="en-US" sz="1300" b="0" kern="1200" dirty="0">
+                <a:solidFill>
+                  <a:schemeClr val="tx1"/>
+                </a:solidFill>
+                <a:effectLst/>
+                <a:latin typeface="+mn-lt"/>
+                <a:ea typeface="+mn-ea"/>
+                <a:cs typeface="+mn-cs"/>
+              </a:rPr>
+              <a:t>(*</a:t>
+            </a:r>
+            <a:r>
+              <a:rPr lang="en-US" sz="1300" b="0" i="1" kern="1200" dirty="0">
+                <a:solidFill>
+                  <a:schemeClr val="tx1"/>
+                </a:solidFill>
+                <a:effectLst/>
+                <a:latin typeface="+mn-lt"/>
+                <a:ea typeface="+mn-ea"/>
+                <a:cs typeface="+mn-cs"/>
+              </a:rPr>
+              <a:t> more complicated variant with non-constant constructors </a:t>
+            </a:r>
+            <a:r>
+              <a:rPr lang="en-US" sz="1300" b="0" kern="1200" dirty="0">
+                <a:solidFill>
+                  <a:schemeClr val="tx1"/>
+                </a:solidFill>
+                <a:effectLst/>
+                <a:latin typeface="+mn-lt"/>
+                <a:ea typeface="+mn-ea"/>
+                <a:cs typeface="+mn-cs"/>
+              </a:rPr>
+              <a:t>*)</a:t>
+            </a:r>
+          </a:p>
+          <a:p>
+            <a:br>
+              <a:rPr lang="en-US" sz="1300" b="0" kern="1200" dirty="0">
+                <a:solidFill>
+                  <a:schemeClr val="tx1"/>
+                </a:solidFill>
+                <a:effectLst/>
+                <a:latin typeface="+mn-lt"/>
+                <a:ea typeface="+mn-ea"/>
+                <a:cs typeface="+mn-cs"/>
+              </a:rPr>
+            </a:br>
+            <a:r>
+              <a:rPr lang="en-US" sz="1300" b="0" u="sng" kern="1200" dirty="0">
+                <a:solidFill>
+                  <a:schemeClr val="tx1"/>
+                </a:solidFill>
+                <a:effectLst/>
+                <a:latin typeface="+mn-lt"/>
+                <a:ea typeface="+mn-ea"/>
+                <a:cs typeface="+mn-cs"/>
+              </a:rPr>
+              <a:t>type</a:t>
+            </a:r>
+            <a:r>
+              <a:rPr lang="en-US" sz="1300" b="0" kern="1200" dirty="0">
+                <a:solidFill>
+                  <a:schemeClr val="tx1"/>
+                </a:solidFill>
+                <a:effectLst/>
+                <a:latin typeface="+mn-lt"/>
+                <a:ea typeface="+mn-ea"/>
+                <a:cs typeface="+mn-cs"/>
+              </a:rPr>
+              <a:t> </a:t>
+            </a:r>
+            <a:r>
+              <a:rPr lang="en-US" sz="1300" b="1" kern="1200" dirty="0">
+                <a:solidFill>
+                  <a:schemeClr val="tx1"/>
+                </a:solidFill>
+                <a:effectLst/>
+                <a:latin typeface="+mn-lt"/>
+                <a:ea typeface="+mn-ea"/>
+                <a:cs typeface="+mn-cs"/>
+              </a:rPr>
+              <a:t>point</a:t>
+            </a:r>
+            <a:r>
+              <a:rPr lang="en-US" sz="1300" b="0" kern="1200" dirty="0">
+                <a:solidFill>
+                  <a:schemeClr val="tx1"/>
+                </a:solidFill>
+                <a:effectLst/>
+                <a:latin typeface="+mn-lt"/>
+                <a:ea typeface="+mn-ea"/>
+                <a:cs typeface="+mn-cs"/>
+              </a:rPr>
+              <a:t> </a:t>
+            </a:r>
+            <a:r>
+              <a:rPr lang="en-US" sz="1300" b="1" kern="1200" dirty="0">
+                <a:solidFill>
+                  <a:schemeClr val="tx1"/>
+                </a:solidFill>
+                <a:effectLst/>
+                <a:latin typeface="+mn-lt"/>
+                <a:ea typeface="+mn-ea"/>
+                <a:cs typeface="+mn-cs"/>
+              </a:rPr>
+              <a:t>=</a:t>
+            </a:r>
+            <a:r>
+              <a:rPr lang="en-US" sz="1300" b="0" kern="1200" dirty="0">
+                <a:solidFill>
+                  <a:schemeClr val="tx1"/>
+                </a:solidFill>
+                <a:effectLst/>
+                <a:latin typeface="+mn-lt"/>
+                <a:ea typeface="+mn-ea"/>
+                <a:cs typeface="+mn-cs"/>
+              </a:rPr>
+              <a:t> float </a:t>
+            </a:r>
+            <a:r>
+              <a:rPr lang="en-US" sz="1300" b="1" kern="1200" dirty="0">
+                <a:solidFill>
+                  <a:schemeClr val="tx1"/>
+                </a:solidFill>
+                <a:effectLst/>
+                <a:latin typeface="+mn-lt"/>
+                <a:ea typeface="+mn-ea"/>
+                <a:cs typeface="+mn-cs"/>
+              </a:rPr>
+              <a:t>*</a:t>
+            </a:r>
+            <a:r>
+              <a:rPr lang="en-US" sz="1300" b="0" kern="1200" dirty="0">
+                <a:solidFill>
+                  <a:schemeClr val="tx1"/>
+                </a:solidFill>
+                <a:effectLst/>
+                <a:latin typeface="+mn-lt"/>
+                <a:ea typeface="+mn-ea"/>
+                <a:cs typeface="+mn-cs"/>
+              </a:rPr>
+              <a:t> float</a:t>
+            </a:r>
+          </a:p>
+          <a:p>
+            <a:br>
+              <a:rPr lang="en-US" sz="1300" b="0" kern="1200" dirty="0">
+                <a:solidFill>
+                  <a:schemeClr val="tx1"/>
+                </a:solidFill>
+                <a:effectLst/>
+                <a:latin typeface="+mn-lt"/>
+                <a:ea typeface="+mn-ea"/>
+                <a:cs typeface="+mn-cs"/>
+              </a:rPr>
+            </a:br>
+            <a:r>
+              <a:rPr lang="en-US" sz="1300" b="0" u="sng" kern="1200" dirty="0">
+                <a:solidFill>
+                  <a:schemeClr val="tx1"/>
+                </a:solidFill>
+                <a:effectLst/>
+                <a:latin typeface="+mn-lt"/>
+                <a:ea typeface="+mn-ea"/>
+                <a:cs typeface="+mn-cs"/>
+              </a:rPr>
+              <a:t>type</a:t>
+            </a:r>
+            <a:r>
+              <a:rPr lang="en-US" sz="1300" b="0" kern="1200" dirty="0">
+                <a:solidFill>
+                  <a:schemeClr val="tx1"/>
+                </a:solidFill>
+                <a:effectLst/>
+                <a:latin typeface="+mn-lt"/>
+                <a:ea typeface="+mn-ea"/>
+                <a:cs typeface="+mn-cs"/>
+              </a:rPr>
+              <a:t> </a:t>
+            </a:r>
+            <a:r>
+              <a:rPr lang="en-US" sz="1300" b="1" kern="1200" dirty="0">
+                <a:solidFill>
+                  <a:schemeClr val="tx1"/>
+                </a:solidFill>
+                <a:effectLst/>
+                <a:latin typeface="+mn-lt"/>
+                <a:ea typeface="+mn-ea"/>
+                <a:cs typeface="+mn-cs"/>
+              </a:rPr>
+              <a:t>shape</a:t>
+            </a:r>
+            <a:r>
+              <a:rPr lang="en-US" sz="1300" b="0" kern="1200" dirty="0">
+                <a:solidFill>
+                  <a:schemeClr val="tx1"/>
+                </a:solidFill>
+                <a:effectLst/>
+                <a:latin typeface="+mn-lt"/>
+                <a:ea typeface="+mn-ea"/>
+                <a:cs typeface="+mn-cs"/>
+              </a:rPr>
+              <a:t> </a:t>
+            </a:r>
+            <a:r>
+              <a:rPr lang="en-US" sz="1300" b="1" kern="1200" dirty="0">
+                <a:solidFill>
+                  <a:schemeClr val="tx1"/>
+                </a:solidFill>
+                <a:effectLst/>
+                <a:latin typeface="+mn-lt"/>
+                <a:ea typeface="+mn-ea"/>
+                <a:cs typeface="+mn-cs"/>
+              </a:rPr>
+              <a:t>=</a:t>
+            </a:r>
+            <a:r>
+              <a:rPr lang="en-US" sz="1300" b="0" kern="1200" dirty="0">
+                <a:solidFill>
+                  <a:schemeClr val="tx1"/>
+                </a:solidFill>
+                <a:effectLst/>
+                <a:latin typeface="+mn-lt"/>
+                <a:ea typeface="+mn-ea"/>
+                <a:cs typeface="+mn-cs"/>
+              </a:rPr>
+              <a:t> </a:t>
+            </a:r>
+          </a:p>
+          <a:p>
+            <a:r>
+              <a:rPr lang="en-US" sz="1300" b="0" kern="1200" dirty="0">
+                <a:solidFill>
+                  <a:schemeClr val="tx1"/>
+                </a:solidFill>
+                <a:effectLst/>
+                <a:latin typeface="+mn-lt"/>
+                <a:ea typeface="+mn-ea"/>
+                <a:cs typeface="+mn-cs"/>
+              </a:rPr>
               <a:t>  </a:t>
             </a:r>
             <a:r>
@@ -1714,7 +1366,7 @@
                 <a:ea typeface="+mn-ea"/>
                 <a:cs typeface="+mn-cs"/>
               </a:rPr>
-              <a:t>Rectangle</a:t>
+              <a:t>Circle</a:t>
             </a:r>
             <a:r>
               <a:rPr lang="en-US" sz="1300" b="0" kern="1200" dirty="0">
@@ -1741,16 +1393,16 @@
               <a:t>{</a:t>
             </a:r>
             <a:r>
-              <a:rPr lang="en-US" sz="1300" b="0" i="1" kern="1200" dirty="0" err="1">
-                <a:solidFill>
-                  <a:schemeClr val="tx1"/>
-                </a:solidFill>
-                <a:effectLst/>
-                <a:latin typeface="+mn-lt"/>
-                <a:ea typeface="+mn-ea"/>
-                <a:cs typeface="+mn-cs"/>
-              </a:rPr>
-              <a:t>lower_left</a:t>
+              <a:rPr lang="en-US" sz="1300" b="0" i="1" kern="1200" dirty="0">
+                <a:solidFill>
+                  <a:schemeClr val="tx1"/>
+                </a:solidFill>
+                <a:effectLst/>
+                <a:latin typeface="+mn-lt"/>
+                <a:ea typeface="+mn-ea"/>
+                <a:cs typeface="+mn-cs"/>
+              </a:rPr>
+              <a:t>center</a:t>
             </a:r>
             <a:r>
               <a:rPr lang="en-US" sz="1300" b="0" kern="1200" dirty="0">
@@ -1789,16 +1441,16 @@
               <a:t> point; </a:t>
             </a:r>
             <a:r>
-              <a:rPr lang="en-US" sz="1300" b="0" i="1" kern="1200" dirty="0" err="1">
-                <a:solidFill>
-                  <a:schemeClr val="tx1"/>
-                </a:solidFill>
-                <a:effectLst/>
-                <a:latin typeface="+mn-lt"/>
-                <a:ea typeface="+mn-ea"/>
-                <a:cs typeface="+mn-cs"/>
-              </a:rPr>
-              <a:t>upper_right</a:t>
+              <a:rPr lang="en-US" sz="1300" b="0" i="1" kern="1200" dirty="0">
+                <a:solidFill>
+                  <a:schemeClr val="tx1"/>
+                </a:solidFill>
+                <a:effectLst/>
+                <a:latin typeface="+mn-lt"/>
+                <a:ea typeface="+mn-ea"/>
+                <a:cs typeface="+mn-cs"/>
+              </a:rPr>
+              <a:t>radius</a:t>
             </a:r>
             <a:r>
               <a:rPr lang="en-US" sz="1300" b="0" kern="1200" dirty="0">
@@ -1834,7 +1486,7 @@
                 <a:ea typeface="+mn-ea"/>
                 <a:cs typeface="+mn-cs"/>
               </a:rPr>
-              <a:t> point</a:t>
+              <a:t> float</a:t>
             </a:r>
             <a:r>
               <a:rPr lang="en-US" sz="1300" b="1" kern="1200" dirty="0">
@@ -1869,6 +1521,197 @@
                 <a:ea typeface="+mn-ea"/>
                 <a:cs typeface="+mn-cs"/>
               </a:rPr>
+              <a:t>  </a:t>
+            </a:r>
+            <a:r>
+              <a:rPr lang="en-US" sz="1300" b="1" kern="1200" dirty="0">
+                <a:solidFill>
+                  <a:schemeClr val="tx1"/>
+                </a:solidFill>
+                <a:effectLst/>
+                <a:latin typeface="+mn-lt"/>
+                <a:ea typeface="+mn-ea"/>
+                <a:cs typeface="+mn-cs"/>
+              </a:rPr>
+              <a:t>|</a:t>
+            </a:r>
+            <a:r>
+              <a:rPr lang="en-US" sz="1300" b="0" kern="1200" dirty="0">
+                <a:solidFill>
+                  <a:schemeClr val="tx1"/>
+                </a:solidFill>
+                <a:effectLst/>
+                <a:latin typeface="+mn-lt"/>
+                <a:ea typeface="+mn-ea"/>
+                <a:cs typeface="+mn-cs"/>
+              </a:rPr>
+              <a:t> </a:t>
+            </a:r>
+            <a:r>
+              <a:rPr lang="en-US" sz="1300" b="1" kern="1200" dirty="0">
+                <a:solidFill>
+                  <a:schemeClr val="tx1"/>
+                </a:solidFill>
+                <a:effectLst/>
+                <a:latin typeface="+mn-lt"/>
+                <a:ea typeface="+mn-ea"/>
+                <a:cs typeface="+mn-cs"/>
+              </a:rPr>
+              <a:t>Rectangle</a:t>
+            </a:r>
+            <a:r>
+              <a:rPr lang="en-US" sz="1300" b="0" kern="1200" dirty="0">
+                <a:solidFill>
+                  <a:schemeClr val="tx1"/>
+                </a:solidFill>
+                <a:effectLst/>
+                <a:latin typeface="+mn-lt"/>
+                <a:ea typeface="+mn-ea"/>
+                <a:cs typeface="+mn-cs"/>
+              </a:rPr>
+              <a:t> of </a:t>
+            </a:r>
+            <a:r>
+              <a:rPr lang="en-US" sz="1300" b="1" kern="1200" dirty="0">
+                <a:solidFill>
+                  <a:schemeClr val="tx1"/>
+                </a:solidFill>
+                <a:effectLst/>
+                <a:latin typeface="+mn-lt"/>
+                <a:ea typeface="+mn-ea"/>
+                <a:cs typeface="+mn-cs"/>
+              </a:rPr>
+              <a:t>{</a:t>
+            </a:r>
+            <a:r>
+              <a:rPr lang="en-US" sz="1300" b="0" i="1" kern="1200" dirty="0" err="1">
+                <a:solidFill>
+                  <a:schemeClr val="tx1"/>
+                </a:solidFill>
+                <a:effectLst/>
+                <a:latin typeface="+mn-lt"/>
+                <a:ea typeface="+mn-ea"/>
+                <a:cs typeface="+mn-cs"/>
+              </a:rPr>
+              <a:t>lower_left</a:t>
+            </a:r>
+            <a:r>
+              <a:rPr lang="en-US" sz="1300" b="0" kern="1200" dirty="0">
+                <a:solidFill>
+                  <a:schemeClr val="tx1"/>
+                </a:solidFill>
+                <a:effectLst/>
+                <a:latin typeface="+mn-lt"/>
+                <a:ea typeface="+mn-ea"/>
+                <a:cs typeface="+mn-cs"/>
+              </a:rPr>
+              <a:t> </a:t>
+            </a:r>
+            <a:r>
+              <a:rPr lang="en-US" sz="1300" b="1" kern="1200" dirty="0">
+                <a:solidFill>
+                  <a:schemeClr val="tx1"/>
+                </a:solidFill>
+                <a:effectLst/>
+                <a:latin typeface="+mn-lt"/>
+                <a:ea typeface="+mn-ea"/>
+                <a:cs typeface="+mn-cs"/>
+              </a:rPr>
+              <a:t>:</a:t>
+            </a:r>
+            <a:r>
+              <a:rPr lang="en-US" sz="1300" b="0" kern="1200" dirty="0">
+                <a:solidFill>
+                  <a:schemeClr val="tx1"/>
+                </a:solidFill>
+                <a:effectLst/>
+                <a:latin typeface="+mn-lt"/>
+                <a:ea typeface="+mn-ea"/>
+                <a:cs typeface="+mn-cs"/>
+              </a:rPr>
+              <a:t> point; </a:t>
+            </a:r>
+            <a:r>
+              <a:rPr lang="en-US" sz="1300" b="0" i="1" kern="1200" dirty="0" err="1">
+                <a:solidFill>
+                  <a:schemeClr val="tx1"/>
+                </a:solidFill>
+                <a:effectLst/>
+                <a:latin typeface="+mn-lt"/>
+                <a:ea typeface="+mn-ea"/>
+                <a:cs typeface="+mn-cs"/>
+              </a:rPr>
+              <a:t>upper_right</a:t>
+            </a:r>
+            <a:r>
+              <a:rPr lang="en-US" sz="1300" b="0" kern="1200" dirty="0">
+                <a:solidFill>
+                  <a:schemeClr val="tx1"/>
+                </a:solidFill>
+                <a:effectLst/>
+                <a:latin typeface="+mn-lt"/>
+                <a:ea typeface="+mn-ea"/>
+                <a:cs typeface="+mn-cs"/>
+              </a:rPr>
+              <a:t> </a:t>
+            </a:r>
+            <a:r>
+              <a:rPr lang="en-US" sz="1300" b="1" kern="1200" dirty="0">
+                <a:solidFill>
+                  <a:schemeClr val="tx1"/>
+                </a:solidFill>
+                <a:effectLst/>
+                <a:latin typeface="+mn-lt"/>
+                <a:ea typeface="+mn-ea"/>
+                <a:cs typeface="+mn-cs"/>
+              </a:rPr>
+              <a:t>:</a:t>
+            </a:r>
+            <a:r>
+              <a:rPr lang="en-US" sz="1300" b="0" kern="1200" dirty="0">
+                <a:solidFill>
+                  <a:schemeClr val="tx1"/>
+                </a:solidFill>
+                <a:effectLst/>
+                <a:latin typeface="+mn-lt"/>
+                <a:ea typeface="+mn-ea"/>
+                <a:cs typeface="+mn-cs"/>
+              </a:rPr>
+              <a:t> point</a:t>
+            </a:r>
+            <a:r>
+              <a:rPr lang="en-US" sz="1300" b="1" kern="1200" dirty="0">
+                <a:solidFill>
+                  <a:schemeClr val="tx1"/>
+                </a:solidFill>
+                <a:effectLst/>
+                <a:latin typeface="+mn-lt"/>
+                <a:ea typeface="+mn-ea"/>
+                <a:cs typeface="+mn-cs"/>
+              </a:rPr>
+              <a:t>}</a:t>
+            </a:r>
+            <a:endParaRPr lang="en-US" sz="1300" b="0" kern="1200" dirty="0">
+              <a:solidFill>
+                <a:schemeClr val="tx1"/>
+              </a:solidFill>
+              <a:effectLst/>
+              <a:latin typeface="+mn-lt"/>
+              <a:ea typeface="+mn-ea"/>
+              <a:cs typeface="+mn-cs"/>
+            </a:endParaRPr>
+          </a:p>
+          <a:p>
+            <a:r>
+              <a:rPr lang="en-US" sz="1300" b="0" kern="1200" dirty="0">
+                <a:solidFill>
+                  <a:schemeClr val="tx1"/>
+                </a:solidFill>
+                <a:effectLst/>
+                <a:latin typeface="+mn-lt"/>
+                <a:ea typeface="+mn-ea"/>
+                <a:cs typeface="+mn-cs"/>
+              </a:rPr>
               <a:t>  (*</a:t>
             </a:r>
             <a:r>
@@ -1918,6 +1761,31 @@
                 <a:cs typeface="+mn-cs"/>
               </a:rPr>
               <a:t>*)</a:t>
+            </a:r>
+          </a:p>
+          <a:p>
+            <a:endParaRPr lang="en-US" sz="1300" b="0" kern="1200" dirty="0">
+              <a:solidFill>
+                <a:schemeClr val="tx1"/>
+              </a:solidFill>
+              <a:effectLst/>
+              <a:latin typeface="+mn-lt"/>
+              <a:ea typeface="+mn-ea"/>
+              <a:cs typeface="+mn-cs"/>
+            </a:endParaRPr>
+          </a:p>
+          <a:p>
+            <a:r>
+              <a:rPr lang="en-US" sz="1300" b="0" kern="1200" dirty="0">
+                <a:solidFill>
+                  <a:schemeClr val="tx1"/>
+                </a:solidFill>
+                <a:effectLst/>
+                <a:latin typeface="+mn-lt"/>
+                <a:ea typeface="+mn-ea"/>
+                <a:cs typeface="+mn-cs"/>
+              </a:rPr>
+              <a:t>let s = Circle {center=(0.,0.); radius=1.}</a:t>
             </a:r>
           </a:p>
           <a:p>
@@ -6651,7 +6519,7 @@
           <a:p>
             <a:fld id="{B7975FD5-AB21-4C45-BFE8-1D3F02B463E2}" type="slidenum">
               <a:rPr lang="en-US" smtClean="0"/>
-              <a:t>14</a:t>
+              <a:t>13</a:t>
             </a:fld>
             <a:endParaRPr lang="en-US"/>
           </a:p>
@@ -7369,7 +7237,7 @@
           <a:p>
             <a:fld id="{B7975FD5-AB21-4C45-BFE8-1D3F02B463E2}" type="slidenum">
               <a:rPr lang="en-US" smtClean="0"/>
-              <a:t>15</a:t>
+              <a:t>14</a:t>
             </a:fld>
             <a:endParaRPr lang="en-US"/>
           </a:p>
@@ -7456,7 +7324,7 @@
           <a:p>
             <a:fld id="{B7975FD5-AB21-4C45-BFE8-1D3F02B463E2}" type="slidenum">
               <a:rPr lang="en-US" smtClean="0"/>
-              <a:t>16</a:t>
+              <a:t>15</a:t>
             </a:fld>
             <a:endParaRPr lang="en-US"/>
           </a:p>
@@ -7627,7 +7495,7 @@
           <a:p>
             <a:fld id="{96331252-4874-F047-84B8-3D3EF8743E79}" type="datetimeFigureOut">
               <a:rPr lang="en-US" smtClean="0"/>
-              <a:t>9/10/19</a:t>
+              <a:t>9/12/19</a:t>
             </a:fld>
             <a:endParaRPr lang="en-US"/>
           </a:p>
@@ -7894,7 +7762,7 @@
           <a:p>
             <a:fld id="{96331252-4874-F047-84B8-3D3EF8743E79}" type="datetimeFigureOut">
               <a:rPr lang="en-US" smtClean="0"/>
-              <a:t>9/10/19</a:t>
+              <a:t>9/12/19</a:t>
             </a:fld>
             <a:endParaRPr lang="en-US"/>
           </a:p>
@@ -8072,7 +7940,7 @@
           <a:p>
             <a:fld id="{96331252-4874-F047-84B8-3D3EF8743E79}" type="datetimeFigureOut">
               <a:rPr lang="en-US" smtClean="0"/>
-              <a:t>9/10/19</a:t>
+              <a:t>9/12/19</a:t>
             </a:fld>
             <a:endParaRPr lang="en-US"/>
           </a:p>
@@ -8240,7 +8108,7 @@
           <a:p>
             <a:fld id="{96331252-4874-F047-84B8-3D3EF8743E79}" type="datetimeFigureOut">
               <a:rPr lang="en-US" smtClean="0"/>
-              <a:t>9/10/19</a:t>
+              <a:t>9/12/19</a:t>
             </a:fld>
             <a:endParaRPr lang="en-US"/>
           </a:p>
@@ -8485,7 +8353,7 @@
           <a:p>
             <a:fld id="{96331252-4874-F047-84B8-3D3EF8743E79}" type="datetimeFigureOut">
               <a:rPr lang="en-US" smtClean="0"/>
-              <a:t>9/10/19</a:t>
+              <a:t>9/12/19</a:t>
             </a:fld>
             <a:endParaRPr lang="en-US"/>
           </a:p>
@@ -8770,7 +8638,7 @@
           <a:p>
             <a:fld id="{96331252-4874-F047-84B8-3D3EF8743E79}" type="datetimeFigureOut">
               <a:rPr lang="en-US" smtClean="0"/>
-              <a:t>9/10/19</a:t>
+              <a:t>9/12/19</a:t>
             </a:fld>
             <a:endParaRPr lang="en-US"/>
           </a:p>
@@ -9189,7 +9057,7 @@
           <a:p>
             <a:fld id="{96331252-4874-F047-84B8-3D3EF8743E79}" type="datetimeFigureOut">
               <a:rPr lang="en-US" smtClean="0"/>
-              <a:t>9/10/19</a:t>
+              <a:t>9/12/19</a:t>
             </a:fld>
             <a:endParaRPr lang="en-US"/>
           </a:p>
@@ -9306,7 +9174,7 @@
           <a:p>
             <a:fld id="{96331252-4874-F047-84B8-3D3EF8743E79}" type="datetimeFigureOut">
               <a:rPr lang="en-US" smtClean="0"/>
-              <a:t>9/10/19</a:t>
+              <a:t>9/12/19</a:t>
             </a:fld>
             <a:endParaRPr lang="en-US"/>
           </a:p>
@@ -9401,7 +9269,7 @@
           <a:p>
             <a:fld id="{96331252-4874-F047-84B8-3D3EF8743E79}" type="datetimeFigureOut">
               <a:rPr lang="en-US" smtClean="0"/>
-              <a:t>9/10/19</a:t>
+              <a:t>9/12/19</a:t>
             </a:fld>
             <a:endParaRPr lang="en-US"/>
           </a:p>
@@ -9676,7 +9544,7 @@
           <a:p>
             <a:fld id="{96331252-4874-F047-84B8-3D3EF8743E79}" type="datetimeFigureOut">
               <a:rPr lang="en-US" smtClean="0"/>
-              <a:t>9/10/19</a:t>
+              <a:t>9/12/19</a:t>
             </a:fld>
             <a:endParaRPr lang="en-US"/>
           </a:p>
@@ -9928,7 +9796,7 @@
           <a:p>
             <a:fld id="{96331252-4874-F047-84B8-3D3EF8743E79}" type="datetimeFigureOut">
               <a:rPr lang="en-US" smtClean="0"/>
-              <a:t>9/10/19</a:t>
+              <a:t>9/12/19</a:t>
             </a:fld>
             <a:endParaRPr lang="en-US"/>
           </a:p>
@@ -10142,7 +10010,7 @@
             <a:fld id="{96331252-4874-F047-84B8-3D3EF8743E79}" type="datetimeFigureOut">
               <a:rPr lang="en-US" smtClean="0"/>
               <a:pPr/>
-              <a:t>9/10/19</a:t>
+              <a:t>9/12/19</a:t>
             </a:fld>
             <a:endParaRPr lang="en-US"/>
           </a:p>
@@ -11399,89 +11267,6 @@
           <p:cNvPr id="4" name="Title 3">
             <a:extLst>
               <a:ext uri="{FF2B5EF4-FFF2-40B4-BE49-F238E27FC236}">
-                <a16:creationId xmlns:a16="http://schemas.microsoft.com/office/drawing/2014/main" id="{EB1D571E-EFEA-954D-917B-91874B27210D}"/>
-              </a:ext>
-            </a:extLst>
-          </p:cNvPr>
-          <p:cNvSpPr>
-            <a:spLocks noGrp="1"/>
-          </p:cNvSpPr>
-          <p:nvPr>
-            <p:ph type="title"/>
-          </p:nvPr>
-        </p:nvSpPr>
-        <p:spPr/>
-        <p:txBody>
-          <a:bodyPr/>
-          <a:lstStyle/>
-          <a:p>
-            <a:r>
-              <a:rPr lang="en-US"/>
-              <a:t>Clicker Question 3</a:t>
-            </a:r>
-          </a:p>
-        </p:txBody>
-      </p:sp>
-      <p:sp>
-        <p:nvSpPr>
-          <p:cNvPr id="5" name="Text Placeholder 4">
-            <a:extLst>
-              <a:ext uri="{FF2B5EF4-FFF2-40B4-BE49-F238E27FC236}">
-                <a16:creationId xmlns:a16="http://schemas.microsoft.com/office/drawing/2014/main" id="{7137226E-A1F6-FB41-8934-98BEA425FB0A}"/>
-              </a:ext>
-            </a:extLst>
-          </p:cNvPr>
-          <p:cNvSpPr>
-            <a:spLocks noGrp="1"/>
-          </p:cNvSpPr>
-          <p:nvPr>
-            <p:ph type="body" idx="1"/>
-          </p:nvPr>
-        </p:nvSpPr>
-        <p:spPr/>
-        <p:txBody>
-          <a:bodyPr/>
-          <a:lstStyle/>
-          <a:p>
-            <a:endParaRPr lang="en-US"/>
-          </a:p>
-        </p:txBody>
-      </p:sp>
-    </p:spTree>
-    <p:extLst>
-      <p:ext uri="{BB962C8B-B14F-4D97-AF65-F5344CB8AC3E}">
-        <p14:creationId xmlns:p14="http://schemas.microsoft.com/office/powerpoint/2010/main" val="301931492"/>
-      </p:ext>
-    </p:extLst>
-  </p:cSld>
-  <p:clrMapOvr>
-    <a:masterClrMapping/>
-  </p:clrMapOvr>
-</p:sld>
-</file>
-
-<file path=ppt/slides/slide14.xml><?xml version="1.0" encoding="utf-8"?>
-<p:sld xmlns:a="http://schemas.openxmlformats.org/drawingml/2006/main" xmlns:r="http://schemas.openxmlformats.org/officeDocument/2006/relationships" xmlns:p="http://schemas.openxmlformats.org/presentationml/2006/main">
-  <p:cSld>
-    <p:spTree>
-      <p:nvGrpSpPr>
-        <p:cNvPr id="1" name=""/>
-        <p:cNvGrpSpPr/>
-        <p:nvPr/>
-      </p:nvGrpSpPr>
-      <p:grpSpPr>
-        <a:xfrm>
-          <a:off x="0" y="0"/>
-          <a:ext cx="0" cy="0"/>
-          <a:chOff x="0" y="0"/>
-          <a:chExt cx="0" cy="0"/>
-        </a:xfrm>
-      </p:grpSpPr>
-      <p:sp>
-        <p:nvSpPr>
-          <p:cNvPr id="4" name="Title 3">
-            <a:extLst>
-              <a:ext uri="{FF2B5EF4-FFF2-40B4-BE49-F238E27FC236}">
                 <a16:creationId xmlns:a16="http://schemas.microsoft.com/office/drawing/2014/main" id="{823BDC09-A683-BE4A-9F38-142FB1F3D0C8}"/>
               </a:ext>
             </a:extLst>
@@ -11543,7 +11328,7 @@
 </p:sld>
 </file>
 
-<file path=ppt/slides/slide15.xml><?xml version="1.0" encoding="utf-8"?>
+<file path=ppt/slides/slide14.xml><?xml version="1.0" encoding="utf-8"?>
 <p:sld xmlns:a="http://schemas.openxmlformats.org/drawingml/2006/main" xmlns:r="http://schemas.openxmlformats.org/officeDocument/2006/relationships" xmlns:p="http://schemas.openxmlformats.org/presentationml/2006/main">
   <p:cSld>
     <p:spTree>
@@ -11827,7 +11612,7 @@
 </p:sld>
 </file>
 
-<file path=ppt/slides/slide16.xml><?xml version="1.0" encoding="utf-8"?>
+<file path=ppt/slides/slide15.xml><?xml version="1.0" encoding="utf-8"?>
 <p:sld xmlns:a="http://schemas.openxmlformats.org/drawingml/2006/main" xmlns:r="http://schemas.openxmlformats.org/officeDocument/2006/relationships" xmlns:p="http://schemas.openxmlformats.org/presentationml/2006/main">
   <p:cSld>
     <p:spTree>
@@ -12079,7 +11864,7 @@
 </p:sld>
 </file>
 
-<file path=ppt/slides/slide17.xml><?xml version="1.0" encoding="utf-8"?>
+<file path=ppt/slides/slide16.xml><?xml version="1.0" encoding="utf-8"?>
 <p:sld xmlns:a="http://schemas.openxmlformats.org/drawingml/2006/main" xmlns:r="http://schemas.openxmlformats.org/officeDocument/2006/relationships" xmlns:p="http://schemas.openxmlformats.org/presentationml/2006/main">
   <p:cSld>
     <p:spTree>
@@ -12139,7 +11924,7 @@
 </p:sld>
 </file>
 
-<file path=ppt/slides/slide18.xml><?xml version="1.0" encoding="utf-8"?>
+<file path=ppt/slides/slide17.xml><?xml version="1.0" encoding="utf-8"?>
 <p:sld xmlns:a="http://schemas.openxmlformats.org/drawingml/2006/main" xmlns:r="http://schemas.openxmlformats.org/officeDocument/2006/relationships" xmlns:p="http://schemas.openxmlformats.org/presentationml/2006/main">
   <p:cSld>
     <p:spTree>
@@ -12222,7 +12007,7 @@
 </p:sld>
 </file>
 
-<file path=ppt/slides/slide19.xml><?xml version="1.0" encoding="utf-8"?>
+<file path=ppt/slides/slide18.xml><?xml version="1.0" encoding="utf-8"?>
 <p:sld xmlns:a="http://schemas.openxmlformats.org/drawingml/2006/main" xmlns:r="http://schemas.openxmlformats.org/officeDocument/2006/relationships" xmlns:p="http://schemas.openxmlformats.org/presentationml/2006/main">
   <p:cSld>
     <p:spTree>
@@ -12670,6 +12455,158 @@
 </p:sld>
 </file>
 
+<file path=ppt/slides/slide19.xml><?xml version="1.0" encoding="utf-8"?>
+<p:sld xmlns:a="http://schemas.openxmlformats.org/drawingml/2006/main" xmlns:r="http://schemas.openxmlformats.org/officeDocument/2006/relationships" xmlns:p="http://schemas.openxmlformats.org/presentationml/2006/main">
+  <p:cSld>
+    <p:spTree>
+      <p:nvGrpSpPr>
+        <p:cNvPr id="1" name=""/>
+        <p:cNvGrpSpPr/>
+        <p:nvPr/>
+      </p:nvGrpSpPr>
+      <p:grpSpPr>
+        <a:xfrm>
+          <a:off x="0" y="0"/>
+          <a:ext cx="0" cy="0"/>
+          <a:chOff x="0" y="0"/>
+          <a:chExt cx="0" cy="0"/>
+        </a:xfrm>
+      </p:grpSpPr>
+      <p:sp>
+        <p:nvSpPr>
+          <p:cNvPr id="2" name="Title 1"/>
+          <p:cNvSpPr>
+            <a:spLocks noGrp="1"/>
+          </p:cNvSpPr>
+          <p:nvPr>
+            <p:ph type="title"/>
+          </p:nvPr>
+        </p:nvSpPr>
+        <p:spPr/>
+        <p:txBody>
+          <a:bodyPr/>
+          <a:lstStyle/>
+          <a:p>
+            <a:r>
+              <a:rPr lang="en-US" dirty="0"/>
+              <a:t>Upcoming events</a:t>
+            </a:r>
+          </a:p>
+        </p:txBody>
+      </p:sp>
+      <p:sp>
+        <p:nvSpPr>
+          <p:cNvPr id="3" name="Content Placeholder 2"/>
+          <p:cNvSpPr>
+            <a:spLocks noGrp="1"/>
+          </p:cNvSpPr>
+          <p:nvPr>
+            <p:ph idx="1"/>
+          </p:nvPr>
+        </p:nvSpPr>
+        <p:spPr>
+          <a:xfrm>
+            <a:off x="502920" y="1813560"/>
+            <a:ext cx="9052560" cy="5880785"/>
+          </a:xfrm>
+        </p:spPr>
+        <p:txBody>
+          <a:bodyPr>
+            <a:normAutofit/>
+          </a:bodyPr>
+          <a:lstStyle/>
+          <a:p>
+            <a:pPr marL="382059" lvl="1" indent="-382059">
+              <a:buFont typeface="Arial"/>
+              <a:buChar char="•"/>
+            </a:pPr>
+            <a:r>
+              <a:rPr lang="en-US" sz="3600" dirty="0"/>
+              <a:t>[Mon] R2 due</a:t>
+            </a:r>
+          </a:p>
+          <a:p>
+            <a:pPr marL="382059" lvl="1" indent="-382059">
+              <a:buFont typeface="Arial"/>
+              <a:buChar char="•"/>
+            </a:pPr>
+            <a:r>
+              <a:rPr lang="en-US" sz="3600" dirty="0"/>
+              <a:t>[Mon] Level Up: git</a:t>
+            </a:r>
+          </a:p>
+          <a:p>
+            <a:pPr marL="382059" lvl="1" indent="-382059">
+              <a:buFont typeface="Arial"/>
+              <a:buChar char="•"/>
+            </a:pPr>
+            <a:endParaRPr lang="en-US" sz="3600" dirty="0"/>
+          </a:p>
+          <a:p>
+            <a:pPr marL="0" indent="0">
+              <a:buNone/>
+            </a:pPr>
+            <a:endParaRPr lang="en-US" b="1" dirty="0"/>
+          </a:p>
+          <a:p>
+            <a:pPr marL="0" indent="0">
+              <a:buNone/>
+            </a:pPr>
+            <a:endParaRPr lang="en-US" b="1" dirty="0"/>
+          </a:p>
+          <a:p>
+            <a:pPr marL="0" indent="0">
+              <a:buNone/>
+            </a:pPr>
+            <a:endParaRPr lang="en-US" b="1" dirty="0"/>
+          </a:p>
+          <a:p>
+            <a:pPr marL="0" indent="0" algn="ctr">
+              <a:buNone/>
+            </a:pPr>
+            <a:r>
+              <a:rPr lang="en-US" i="1" dirty="0"/>
+              <a:t>This is powerful.</a:t>
+            </a:r>
+          </a:p>
+          <a:p>
+            <a:pPr marL="0" indent="0" algn="ctr">
+              <a:buNone/>
+            </a:pPr>
+            <a:r>
+              <a:rPr lang="en-US" sz="5700" b="1" dirty="0">
+                <a:solidFill>
+                  <a:srgbClr val="B31B1B"/>
+                </a:solidFill>
+                <a:latin typeface="Engravers MT"/>
+                <a:cs typeface="Engravers MT"/>
+                <a:sym typeface="Wingdings"/>
+              </a:rPr>
+              <a:t>THIS IS 3110</a:t>
+            </a:r>
+            <a:endParaRPr lang="en-US" sz="5700" b="1" dirty="0">
+              <a:solidFill>
+                <a:srgbClr val="B31B1B"/>
+              </a:solidFill>
+              <a:latin typeface="Engravers MT"/>
+              <a:cs typeface="Engravers MT"/>
+            </a:endParaRPr>
+          </a:p>
+        </p:txBody>
+      </p:sp>
+    </p:spTree>
+    <p:extLst>
+      <p:ext uri="{BB962C8B-B14F-4D97-AF65-F5344CB8AC3E}">
+        <p14:creationId xmlns:p14="http://schemas.microsoft.com/office/powerpoint/2010/main" val="715037783"/>
+      </p:ext>
+    </p:extLst>
+  </p:cSld>
+  <p:clrMapOvr>
+    <a:masterClrMapping/>
+  </p:clrMapOvr>
+</p:sld>
+</file>
+
 <file path=ppt/slides/slide2.xml><?xml version="1.0" encoding="utf-8"?>
 <p:sld xmlns:a="http://schemas.openxmlformats.org/drawingml/2006/main" xmlns:r="http://schemas.openxmlformats.org/officeDocument/2006/relationships" xmlns:p="http://schemas.openxmlformats.org/presentationml/2006/main">
   <p:cSld>
@@ -12744,544 +12681,6 @@
     <p:extLst>
       <p:ext uri="{BB962C8B-B14F-4D97-AF65-F5344CB8AC3E}">
         <p14:creationId xmlns:p14="http://schemas.microsoft.com/office/powerpoint/2010/main" val="3680675542"/>
-      </p:ext>
-    </p:extLst>
-  </p:cSld>
-  <p:clrMapOvr>
-    <a:masterClrMapping/>
-  </p:clrMapOvr>
-</p:sld>
-</file>
-
-<file path=ppt/slides/slide20.xml><?xml version="1.0" encoding="utf-8"?>
-<p:sld xmlns:a="http://schemas.openxmlformats.org/drawingml/2006/main" xmlns:r="http://schemas.openxmlformats.org/officeDocument/2006/relationships" xmlns:p="http://schemas.openxmlformats.org/presentationml/2006/main">
-  <p:cSld>
-    <p:spTree>
-      <p:nvGrpSpPr>
-        <p:cNvPr id="1" name=""/>
-        <p:cNvGrpSpPr/>
-        <p:nvPr/>
-      </p:nvGrpSpPr>
-      <p:grpSpPr>
-        <a:xfrm>
-          <a:off x="0" y="0"/>
-          <a:ext cx="0" cy="0"/>
-          <a:chOff x="0" y="0"/>
-          <a:chExt cx="0" cy="0"/>
-        </a:xfrm>
-      </p:grpSpPr>
-      <p:sp>
-        <p:nvSpPr>
-          <p:cNvPr id="2" name="Title 1"/>
-          <p:cNvSpPr>
-            <a:spLocks noGrp="1"/>
-          </p:cNvSpPr>
-          <p:nvPr>
-            <p:ph type="title"/>
-          </p:nvPr>
-        </p:nvSpPr>
-        <p:spPr/>
-        <p:txBody>
-          <a:bodyPr/>
-          <a:lstStyle/>
-          <a:p>
-            <a:r>
-              <a:rPr lang="en-US" dirty="0"/>
-              <a:t>Upcoming events</a:t>
-            </a:r>
-          </a:p>
-        </p:txBody>
-      </p:sp>
-      <p:sp>
-        <p:nvSpPr>
-          <p:cNvPr id="3" name="Content Placeholder 2"/>
-          <p:cNvSpPr>
-            <a:spLocks noGrp="1"/>
-          </p:cNvSpPr>
-          <p:nvPr>
-            <p:ph idx="1"/>
-          </p:nvPr>
-        </p:nvSpPr>
-        <p:spPr>
-          <a:xfrm>
-            <a:off x="502920" y="1813560"/>
-            <a:ext cx="9052560" cy="5880785"/>
-          </a:xfrm>
-        </p:spPr>
-        <p:txBody>
-          <a:bodyPr>
-            <a:normAutofit/>
-          </a:bodyPr>
-          <a:lstStyle/>
-          <a:p>
-            <a:pPr marL="382059" lvl="1" indent="-382059">
-              <a:buFont typeface="Arial"/>
-              <a:buChar char="•"/>
-            </a:pPr>
-            <a:r>
-              <a:rPr lang="en-US" sz="3600" dirty="0"/>
-              <a:t>[Mon] R2 due</a:t>
-            </a:r>
-          </a:p>
-          <a:p>
-            <a:pPr marL="382059" lvl="1" indent="-382059">
-              <a:buFont typeface="Arial"/>
-              <a:buChar char="•"/>
-            </a:pPr>
-            <a:r>
-              <a:rPr lang="en-US" sz="3600" dirty="0"/>
-              <a:t>[Mon] Level Up: git</a:t>
-            </a:r>
-          </a:p>
-          <a:p>
-            <a:pPr marL="382059" lvl="1" indent="-382059">
-              <a:buFont typeface="Arial"/>
-              <a:buChar char="•"/>
-            </a:pPr>
-            <a:endParaRPr lang="en-US" sz="3600" dirty="0"/>
-          </a:p>
-          <a:p>
-            <a:pPr marL="0" indent="0">
-              <a:buNone/>
-            </a:pPr>
-            <a:endParaRPr lang="en-US" b="1" dirty="0"/>
-          </a:p>
-          <a:p>
-            <a:pPr marL="0" indent="0">
-              <a:buNone/>
-            </a:pPr>
-            <a:endParaRPr lang="en-US" b="1" dirty="0"/>
-          </a:p>
-          <a:p>
-            <a:pPr marL="0" indent="0">
-              <a:buNone/>
-            </a:pPr>
-            <a:endParaRPr lang="en-US" b="1" dirty="0"/>
-          </a:p>
-          <a:p>
-            <a:pPr marL="0" indent="0" algn="ctr">
-              <a:buNone/>
-            </a:pPr>
-            <a:r>
-              <a:rPr lang="en-US" i="1" dirty="0"/>
-              <a:t>This is powerful.</a:t>
-            </a:r>
-          </a:p>
-          <a:p>
-            <a:pPr marL="0" indent="0" algn="ctr">
-              <a:buNone/>
-            </a:pPr>
-            <a:r>
-              <a:rPr lang="en-US" sz="5700" b="1" dirty="0">
-                <a:solidFill>
-                  <a:srgbClr val="B31B1B"/>
-                </a:solidFill>
-                <a:latin typeface="Engravers MT"/>
-                <a:cs typeface="Engravers MT"/>
-                <a:sym typeface="Wingdings"/>
-              </a:rPr>
-              <a:t>THIS IS 3110</a:t>
-            </a:r>
-            <a:endParaRPr lang="en-US" sz="5700" b="1" dirty="0">
-              <a:solidFill>
-                <a:srgbClr val="B31B1B"/>
-              </a:solidFill>
-              <a:latin typeface="Engravers MT"/>
-              <a:cs typeface="Engravers MT"/>
-            </a:endParaRPr>
-          </a:p>
-        </p:txBody>
-      </p:sp>
-    </p:spTree>
-    <p:extLst>
-      <p:ext uri="{BB962C8B-B14F-4D97-AF65-F5344CB8AC3E}">
-        <p14:creationId xmlns:p14="http://schemas.microsoft.com/office/powerpoint/2010/main" val="715037783"/>
-      </p:ext>
-    </p:extLst>
-  </p:cSld>
-  <p:clrMapOvr>
-    <a:masterClrMapping/>
-  </p:clrMapOvr>
-</p:sld>
-</file>
-
-<file path=ppt/slides/slide21.xml><?xml version="1.0" encoding="utf-8"?>
-<p:sld xmlns:a="http://schemas.openxmlformats.org/drawingml/2006/main" xmlns:r="http://schemas.openxmlformats.org/officeDocument/2006/relationships" xmlns:p="http://schemas.openxmlformats.org/presentationml/2006/main">
-  <p:cSld>
-    <p:spTree>
-      <p:nvGrpSpPr>
-        <p:cNvPr id="1" name=""/>
-        <p:cNvGrpSpPr/>
-        <p:nvPr/>
-      </p:nvGrpSpPr>
-      <p:grpSpPr>
-        <a:xfrm>
-          <a:off x="0" y="0"/>
-          <a:ext cx="0" cy="0"/>
-          <a:chOff x="0" y="0"/>
-          <a:chExt cx="0" cy="0"/>
-        </a:xfrm>
-      </p:grpSpPr>
-      <p:sp>
-        <p:nvSpPr>
-          <p:cNvPr id="2" name="Title 1">
-            <a:extLst>
-              <a:ext uri="{FF2B5EF4-FFF2-40B4-BE49-F238E27FC236}">
-                <a16:creationId xmlns:a16="http://schemas.microsoft.com/office/drawing/2014/main" id="{30734368-7B91-394F-BACD-772A8F0636C9}"/>
-              </a:ext>
-            </a:extLst>
-          </p:cNvPr>
-          <p:cNvSpPr>
-            <a:spLocks noGrp="1"/>
-          </p:cNvSpPr>
-          <p:nvPr>
-            <p:ph type="title"/>
-          </p:nvPr>
-        </p:nvSpPr>
-        <p:spPr/>
-        <p:txBody>
-          <a:bodyPr/>
-          <a:lstStyle/>
-          <a:p>
-            <a:r>
-              <a:rPr lang="en-US" dirty="0"/>
-              <a:t>Move to recitation</a:t>
-            </a:r>
-          </a:p>
-        </p:txBody>
-      </p:sp>
-      <p:sp>
-        <p:nvSpPr>
-          <p:cNvPr id="3" name="Content Placeholder 2">
-            <a:extLst>
-              <a:ext uri="{FF2B5EF4-FFF2-40B4-BE49-F238E27FC236}">
-                <a16:creationId xmlns:a16="http://schemas.microsoft.com/office/drawing/2014/main" id="{60D02AE9-7929-AE40-A84D-B9CF4888A87C}"/>
-              </a:ext>
-            </a:extLst>
-          </p:cNvPr>
-          <p:cNvSpPr>
-            <a:spLocks noGrp="1"/>
-          </p:cNvSpPr>
-          <p:nvPr>
-            <p:ph idx="1"/>
-          </p:nvPr>
-        </p:nvSpPr>
-        <p:spPr/>
-        <p:txBody>
-          <a:bodyPr/>
-          <a:lstStyle/>
-          <a:p>
-            <a:endParaRPr lang="en-US"/>
-          </a:p>
-        </p:txBody>
-      </p:sp>
-    </p:spTree>
-    <p:extLst>
-      <p:ext uri="{BB962C8B-B14F-4D97-AF65-F5344CB8AC3E}">
-        <p14:creationId xmlns:p14="http://schemas.microsoft.com/office/powerpoint/2010/main" val="2839148167"/>
-      </p:ext>
-    </p:extLst>
-  </p:cSld>
-  <p:clrMapOvr>
-    <a:masterClrMapping/>
-  </p:clrMapOvr>
-</p:sld>
-</file>
-
-<file path=ppt/slides/slide22.xml><?xml version="1.0" encoding="utf-8"?>
-<p:sld xmlns:a="http://schemas.openxmlformats.org/drawingml/2006/main" xmlns:r="http://schemas.openxmlformats.org/officeDocument/2006/relationships" xmlns:p="http://schemas.openxmlformats.org/presentationml/2006/main">
-  <p:cSld>
-    <p:spTree>
-      <p:nvGrpSpPr>
-        <p:cNvPr id="1" name=""/>
-        <p:cNvGrpSpPr/>
-        <p:nvPr/>
-      </p:nvGrpSpPr>
-      <p:grpSpPr>
-        <a:xfrm>
-          <a:off x="0" y="0"/>
-          <a:ext cx="0" cy="0"/>
-          <a:chOff x="0" y="0"/>
-          <a:chExt cx="0" cy="0"/>
-        </a:xfrm>
-      </p:grpSpPr>
-      <p:sp>
-        <p:nvSpPr>
-          <p:cNvPr id="5" name="TextBox 4">
-            <a:extLst>
-              <a:ext uri="{FF2B5EF4-FFF2-40B4-BE49-F238E27FC236}">
-                <a16:creationId xmlns:a16="http://schemas.microsoft.com/office/drawing/2014/main" id="{E71473EB-CC08-AE45-BCA9-21C0743ED2AE}"/>
-              </a:ext>
-            </a:extLst>
-          </p:cNvPr>
-          <p:cNvSpPr txBox="1"/>
-          <p:nvPr/>
-        </p:nvSpPr>
-        <p:spPr>
-          <a:xfrm>
-            <a:off x="2798618" y="-1163782"/>
-            <a:ext cx="4570482" cy="9294852"/>
-          </a:xfrm>
-          <a:prstGeom prst="rect">
-            <a:avLst/>
-          </a:prstGeom>
-          <a:noFill/>
-        </p:spPr>
-        <p:txBody>
-          <a:bodyPr wrap="none" rtlCol="0">
-            <a:spAutoFit/>
-          </a:bodyPr>
-          <a:lstStyle/>
-          <a:p>
-            <a:pPr algn="l"/>
-            <a:r>
-              <a:rPr lang="en-US" sz="59800" dirty="0">
-                <a:latin typeface="Cronos Pro" panose="020C0502030403020304" pitchFamily="34" charset="77"/>
-              </a:rPr>
-              <a:t>+</a:t>
-            </a:r>
-          </a:p>
-        </p:txBody>
-      </p:sp>
-      <p:sp>
-        <p:nvSpPr>
-          <p:cNvPr id="6" name="TextBox 5">
-            <a:extLst>
-              <a:ext uri="{FF2B5EF4-FFF2-40B4-BE49-F238E27FC236}">
-                <a16:creationId xmlns:a16="http://schemas.microsoft.com/office/drawing/2014/main" id="{F16A899A-4F3E-2F42-9CA3-BE1F9BEEB12F}"/>
-              </a:ext>
-            </a:extLst>
-          </p:cNvPr>
-          <p:cNvSpPr txBox="1"/>
-          <p:nvPr/>
-        </p:nvSpPr>
-        <p:spPr>
-          <a:xfrm>
-            <a:off x="3540006" y="6622473"/>
-            <a:ext cx="3087705" cy="584775"/>
-          </a:xfrm>
-          <a:prstGeom prst="rect">
-            <a:avLst/>
-          </a:prstGeom>
-          <a:noFill/>
-        </p:spPr>
-        <p:txBody>
-          <a:bodyPr wrap="none" rtlCol="0">
-            <a:spAutoFit/>
-          </a:bodyPr>
-          <a:lstStyle/>
-          <a:p>
-            <a:pPr algn="l"/>
-            <a:r>
-              <a:rPr lang="en-US" sz="3200" dirty="0">
-                <a:solidFill>
-                  <a:schemeClr val="accent1"/>
-                </a:solidFill>
-                <a:latin typeface="Cronos Pro" panose="020C0502030403020304" pitchFamily="34" charset="77"/>
-              </a:rPr>
-              <a:t>One Of: Sum Type</a:t>
-            </a:r>
-            <a:endParaRPr lang="en-US" sz="3200" dirty="0">
-              <a:latin typeface="Cronos Pro" panose="020C0502030403020304" pitchFamily="34" charset="77"/>
-            </a:endParaRPr>
-          </a:p>
-        </p:txBody>
-      </p:sp>
-    </p:spTree>
-    <p:extLst>
-      <p:ext uri="{BB962C8B-B14F-4D97-AF65-F5344CB8AC3E}">
-        <p14:creationId xmlns:p14="http://schemas.microsoft.com/office/powerpoint/2010/main" val="3394748167"/>
-      </p:ext>
-    </p:extLst>
-  </p:cSld>
-  <p:clrMapOvr>
-    <a:masterClrMapping/>
-  </p:clrMapOvr>
-</p:sld>
-</file>
-
-<file path=ppt/slides/slide23.xml><?xml version="1.0" encoding="utf-8"?>
-<p:sld xmlns:a="http://schemas.openxmlformats.org/drawingml/2006/main" xmlns:r="http://schemas.openxmlformats.org/officeDocument/2006/relationships" xmlns:p="http://schemas.openxmlformats.org/presentationml/2006/main">
-  <p:cSld>
-    <p:spTree>
-      <p:nvGrpSpPr>
-        <p:cNvPr id="1" name=""/>
-        <p:cNvGrpSpPr/>
-        <p:nvPr/>
-      </p:nvGrpSpPr>
-      <p:grpSpPr>
-        <a:xfrm>
-          <a:off x="0" y="0"/>
-          <a:ext cx="0" cy="0"/>
-          <a:chOff x="0" y="0"/>
-          <a:chExt cx="0" cy="0"/>
-        </a:xfrm>
-      </p:grpSpPr>
-      <p:sp>
-        <p:nvSpPr>
-          <p:cNvPr id="5" name="TextBox 4">
-            <a:extLst>
-              <a:ext uri="{FF2B5EF4-FFF2-40B4-BE49-F238E27FC236}">
-                <a16:creationId xmlns:a16="http://schemas.microsoft.com/office/drawing/2014/main" id="{E71473EB-CC08-AE45-BCA9-21C0743ED2AE}"/>
-              </a:ext>
-            </a:extLst>
-          </p:cNvPr>
-          <p:cNvSpPr txBox="1"/>
-          <p:nvPr/>
-        </p:nvSpPr>
-        <p:spPr>
-          <a:xfrm>
-            <a:off x="2798618" y="-1163782"/>
-            <a:ext cx="4570482" cy="9294852"/>
-          </a:xfrm>
-          <a:prstGeom prst="rect">
-            <a:avLst/>
-          </a:prstGeom>
-          <a:noFill/>
-        </p:spPr>
-        <p:txBody>
-          <a:bodyPr wrap="none" rtlCol="0">
-            <a:spAutoFit/>
-          </a:bodyPr>
-          <a:lstStyle/>
-          <a:p>
-            <a:pPr algn="l"/>
-            <a:r>
-              <a:rPr lang="en-US" sz="59800" dirty="0">
-                <a:latin typeface="Cronos Pro" panose="020C0502030403020304" pitchFamily="34" charset="77"/>
-              </a:rPr>
-              <a:t>×</a:t>
-            </a:r>
-          </a:p>
-        </p:txBody>
-      </p:sp>
-      <p:sp>
-        <p:nvSpPr>
-          <p:cNvPr id="3" name="TextBox 2">
-            <a:extLst>
-              <a:ext uri="{FF2B5EF4-FFF2-40B4-BE49-F238E27FC236}">
-                <a16:creationId xmlns:a16="http://schemas.microsoft.com/office/drawing/2014/main" id="{70FEC20D-9789-484E-8538-7D8758439109}"/>
-              </a:ext>
-            </a:extLst>
-          </p:cNvPr>
-          <p:cNvSpPr txBox="1"/>
-          <p:nvPr/>
-        </p:nvSpPr>
-        <p:spPr>
-          <a:xfrm>
-            <a:off x="3225818" y="6594764"/>
-            <a:ext cx="3716082" cy="584775"/>
-          </a:xfrm>
-          <a:prstGeom prst="rect">
-            <a:avLst/>
-          </a:prstGeom>
-          <a:noFill/>
-        </p:spPr>
-        <p:txBody>
-          <a:bodyPr wrap="none" rtlCol="0">
-            <a:spAutoFit/>
-          </a:bodyPr>
-          <a:lstStyle/>
-          <a:p>
-            <a:pPr algn="l"/>
-            <a:r>
-              <a:rPr lang="en-US" sz="3200" dirty="0">
-                <a:solidFill>
-                  <a:schemeClr val="accent1"/>
-                </a:solidFill>
-                <a:latin typeface="Cronos Pro" panose="020C0502030403020304" pitchFamily="34" charset="77"/>
-              </a:rPr>
-              <a:t>Each Of: Product Type</a:t>
-            </a:r>
-            <a:endParaRPr lang="en-US" sz="3200" dirty="0">
-              <a:latin typeface="Cronos Pro" panose="020C0502030403020304" pitchFamily="34" charset="77"/>
-            </a:endParaRPr>
-          </a:p>
-        </p:txBody>
-      </p:sp>
-    </p:spTree>
-    <p:extLst>
-      <p:ext uri="{BB962C8B-B14F-4D97-AF65-F5344CB8AC3E}">
-        <p14:creationId xmlns:p14="http://schemas.microsoft.com/office/powerpoint/2010/main" val="1207320233"/>
-      </p:ext>
-    </p:extLst>
-  </p:cSld>
-  <p:clrMapOvr>
-    <a:masterClrMapping/>
-  </p:clrMapOvr>
-</p:sld>
-</file>
-
-<file path=ppt/slides/slide24.xml><?xml version="1.0" encoding="utf-8"?>
-<p:sld xmlns:a="http://schemas.openxmlformats.org/drawingml/2006/main" xmlns:r="http://schemas.openxmlformats.org/officeDocument/2006/relationships" xmlns:p="http://schemas.openxmlformats.org/presentationml/2006/main">
-  <p:cSld>
-    <p:spTree>
-      <p:nvGrpSpPr>
-        <p:cNvPr id="1" name=""/>
-        <p:cNvGrpSpPr/>
-        <p:nvPr/>
-      </p:nvGrpSpPr>
-      <p:grpSpPr>
-        <a:xfrm>
-          <a:off x="0" y="0"/>
-          <a:ext cx="0" cy="0"/>
-          <a:chOff x="0" y="0"/>
-          <a:chExt cx="0" cy="0"/>
-        </a:xfrm>
-      </p:grpSpPr>
-      <p:sp>
-        <p:nvSpPr>
-          <p:cNvPr id="2" name="TextBox 1">
-            <a:extLst>
-              <a:ext uri="{FF2B5EF4-FFF2-40B4-BE49-F238E27FC236}">
-                <a16:creationId xmlns:a16="http://schemas.microsoft.com/office/drawing/2014/main" id="{252E54F9-E9DE-8349-A64D-4C58E979D0A4}"/>
-              </a:ext>
-            </a:extLst>
-          </p:cNvPr>
-          <p:cNvSpPr txBox="1"/>
-          <p:nvPr/>
-        </p:nvSpPr>
-        <p:spPr>
-          <a:xfrm>
-            <a:off x="1194926" y="1745672"/>
-            <a:ext cx="7800533" cy="4339650"/>
-          </a:xfrm>
-          <a:prstGeom prst="rect">
-            <a:avLst/>
-          </a:prstGeom>
-          <a:noFill/>
-        </p:spPr>
-        <p:txBody>
-          <a:bodyPr wrap="none" rtlCol="0">
-            <a:spAutoFit/>
-          </a:bodyPr>
-          <a:lstStyle/>
-          <a:p>
-            <a:pPr algn="ctr"/>
-            <a:r>
-              <a:rPr lang="en-US" sz="13800" dirty="0">
-                <a:latin typeface="Cronos Pro" panose="020C0502030403020304" pitchFamily="34" charset="77"/>
-              </a:rPr>
-              <a:t>Algebraic</a:t>
-            </a:r>
-            <a:br>
-              <a:rPr lang="en-US" sz="13800" dirty="0">
-                <a:latin typeface="Cronos Pro" panose="020C0502030403020304" pitchFamily="34" charset="77"/>
-              </a:rPr>
-            </a:br>
-            <a:r>
-              <a:rPr lang="en-US" sz="13800" dirty="0">
-                <a:latin typeface="Cronos Pro" panose="020C0502030403020304" pitchFamily="34" charset="77"/>
-              </a:rPr>
-              <a:t>Data Types</a:t>
-            </a:r>
-          </a:p>
-        </p:txBody>
-      </p:sp>
-    </p:spTree>
-    <p:extLst>
-      <p:ext uri="{BB962C8B-B14F-4D97-AF65-F5344CB8AC3E}">
-        <p14:creationId xmlns:p14="http://schemas.microsoft.com/office/powerpoint/2010/main" val="493258632"/>
       </p:ext>
     </p:extLst>
   </p:cSld>

</xml_diff>